<commit_message>
Upload after Milestone 1
</commit_message>
<xml_diff>
--- a/Docs/Agile Docs/User Stories for Progression Tracking V1.pptx
+++ b/Docs/Agile Docs/User Stories for Progression Tracking V1.pptx
@@ -210,7 +210,7 @@
           <a:p>
             <a:fld id="{23746988-C984-4831-B814-5E68E99B7836}" type="datetimeFigureOut">
               <a:rPr lang="en-US" smtClean="0"/>
-              <a:t>9/27/2018</a:t>
+              <a:t>11/6/18</a:t>
             </a:fld>
             <a:endParaRPr lang="en-US"/>
           </a:p>
@@ -274,38 +274,37 @@
           <a:p>
             <a:pPr lvl="0"/>
             <a:r>
-              <a:rPr lang="en-US" smtClean="0"/>
+              <a:rPr lang="en-US"/>
               <a:t>Edit Master text styles</a:t>
             </a:r>
           </a:p>
           <a:p>
             <a:pPr lvl="1"/>
             <a:r>
-              <a:rPr lang="en-US" smtClean="0"/>
+              <a:rPr lang="en-US"/>
               <a:t>Second level</a:t>
             </a:r>
           </a:p>
           <a:p>
             <a:pPr lvl="2"/>
             <a:r>
-              <a:rPr lang="en-US" smtClean="0"/>
+              <a:rPr lang="en-US"/>
               <a:t>Third level</a:t>
             </a:r>
           </a:p>
           <a:p>
             <a:pPr lvl="3"/>
             <a:r>
-              <a:rPr lang="en-US" smtClean="0"/>
+              <a:rPr lang="en-US"/>
               <a:t>Fourth level</a:t>
             </a:r>
           </a:p>
           <a:p>
             <a:pPr lvl="4"/>
             <a:r>
-              <a:rPr lang="en-US" smtClean="0"/>
+              <a:rPr lang="en-US"/>
               <a:t>Fifth level</a:t>
             </a:r>
-            <a:endParaRPr lang="en-US"/>
           </a:p>
         </p:txBody>
       </p:sp>
@@ -522,7 +521,7 @@
           </a:lstStyle>
           <a:p>
             <a:r>
-              <a:rPr lang="en-US" smtClean="0"/>
+              <a:rPr lang="en-US"/>
               <a:t>Click to edit Master title style</a:t>
             </a:r>
             <a:endParaRPr lang="en-US" dirty="0"/>
@@ -593,7 +592,7 @@
           </a:lstStyle>
           <a:p>
             <a:r>
-              <a:rPr lang="en-US" smtClean="0"/>
+              <a:rPr lang="en-US"/>
               <a:t>Click to edit Master subtitle style</a:t>
             </a:r>
             <a:endParaRPr lang="en-US" dirty="0"/>
@@ -617,7 +616,7 @@
           <a:p>
             <a:fld id="{ABB0F0B0-6978-4D30-BBCB-4D58ABA24A05}" type="datetimeFigureOut">
               <a:rPr lang="en-US" smtClean="0"/>
-              <a:t>9/27/2018</a:t>
+              <a:t>11/6/18</a:t>
             </a:fld>
             <a:endParaRPr lang="en-US"/>
           </a:p>
@@ -752,7 +751,7 @@
           <a:lstStyle/>
           <a:p>
             <a:r>
-              <a:rPr lang="en-US" smtClean="0"/>
+              <a:rPr lang="en-US"/>
               <a:t>Click to edit Master title style</a:t>
             </a:r>
             <a:endParaRPr lang="en-US" dirty="0"/>
@@ -776,35 +775,35 @@
           <a:p>
             <a:pPr lvl="0"/>
             <a:r>
-              <a:rPr lang="en-US" smtClean="0"/>
+              <a:rPr lang="en-US"/>
               <a:t>Edit Master text styles</a:t>
             </a:r>
           </a:p>
           <a:p>
             <a:pPr lvl="1"/>
             <a:r>
-              <a:rPr lang="en-US" smtClean="0"/>
+              <a:rPr lang="en-US"/>
               <a:t>Second level</a:t>
             </a:r>
           </a:p>
           <a:p>
             <a:pPr lvl="2"/>
             <a:r>
-              <a:rPr lang="en-US" smtClean="0"/>
+              <a:rPr lang="en-US"/>
               <a:t>Third level</a:t>
             </a:r>
           </a:p>
           <a:p>
             <a:pPr lvl="3"/>
             <a:r>
-              <a:rPr lang="en-US" smtClean="0"/>
+              <a:rPr lang="en-US"/>
               <a:t>Fourth level</a:t>
             </a:r>
           </a:p>
           <a:p>
             <a:pPr lvl="4"/>
             <a:r>
-              <a:rPr lang="en-US" smtClean="0"/>
+              <a:rPr lang="en-US"/>
               <a:t>Fifth level</a:t>
             </a:r>
             <a:endParaRPr lang="en-US" dirty="0"/>
@@ -828,7 +827,7 @@
           <a:p>
             <a:fld id="{ABB0F0B0-6978-4D30-BBCB-4D58ABA24A05}" type="datetimeFigureOut">
               <a:rPr lang="en-US" smtClean="0"/>
-              <a:t>9/27/2018</a:t>
+              <a:t>11/6/18</a:t>
             </a:fld>
             <a:endParaRPr lang="en-US"/>
           </a:p>
@@ -962,7 +961,7 @@
           </a:lstStyle>
           <a:p>
             <a:r>
-              <a:rPr lang="en-US" smtClean="0"/>
+              <a:rPr lang="en-US"/>
               <a:t>Click to edit Master title style</a:t>
             </a:r>
             <a:endParaRPr lang="en-US" dirty="0"/>
@@ -991,35 +990,35 @@
           <a:p>
             <a:pPr lvl="0"/>
             <a:r>
-              <a:rPr lang="en-US" smtClean="0"/>
+              <a:rPr lang="en-US"/>
               <a:t>Edit Master text styles</a:t>
             </a:r>
           </a:p>
           <a:p>
             <a:pPr lvl="1"/>
             <a:r>
-              <a:rPr lang="en-US" smtClean="0"/>
+              <a:rPr lang="en-US"/>
               <a:t>Second level</a:t>
             </a:r>
           </a:p>
           <a:p>
             <a:pPr lvl="2"/>
             <a:r>
-              <a:rPr lang="en-US" smtClean="0"/>
+              <a:rPr lang="en-US"/>
               <a:t>Third level</a:t>
             </a:r>
           </a:p>
           <a:p>
             <a:pPr lvl="3"/>
             <a:r>
-              <a:rPr lang="en-US" smtClean="0"/>
+              <a:rPr lang="en-US"/>
               <a:t>Fourth level</a:t>
             </a:r>
           </a:p>
           <a:p>
             <a:pPr lvl="4"/>
             <a:r>
-              <a:rPr lang="en-US" smtClean="0"/>
+              <a:rPr lang="en-US"/>
               <a:t>Fifth level</a:t>
             </a:r>
             <a:endParaRPr lang="en-US" dirty="0"/>
@@ -1043,7 +1042,7 @@
           <a:p>
             <a:fld id="{ABB0F0B0-6978-4D30-BBCB-4D58ABA24A05}" type="datetimeFigureOut">
               <a:rPr lang="en-US" smtClean="0"/>
-              <a:t>9/27/2018</a:t>
+              <a:t>11/6/18</a:t>
             </a:fld>
             <a:endParaRPr lang="en-US"/>
           </a:p>
@@ -1168,7 +1167,7 @@
           <a:lstStyle/>
           <a:p>
             <a:r>
-              <a:rPr lang="en-US" smtClean="0"/>
+              <a:rPr lang="en-US"/>
               <a:t>Click to edit Master title style</a:t>
             </a:r>
             <a:endParaRPr lang="en-US" dirty="0"/>
@@ -1192,35 +1191,35 @@
           <a:p>
             <a:pPr lvl="0"/>
             <a:r>
-              <a:rPr lang="en-US" smtClean="0"/>
+              <a:rPr lang="en-US"/>
               <a:t>Edit Master text styles</a:t>
             </a:r>
           </a:p>
           <a:p>
             <a:pPr lvl="1"/>
             <a:r>
-              <a:rPr lang="en-US" smtClean="0"/>
+              <a:rPr lang="en-US"/>
               <a:t>Second level</a:t>
             </a:r>
           </a:p>
           <a:p>
             <a:pPr lvl="2"/>
             <a:r>
-              <a:rPr lang="en-US" smtClean="0"/>
+              <a:rPr lang="en-US"/>
               <a:t>Third level</a:t>
             </a:r>
           </a:p>
           <a:p>
             <a:pPr lvl="3"/>
             <a:r>
-              <a:rPr lang="en-US" smtClean="0"/>
+              <a:rPr lang="en-US"/>
               <a:t>Fourth level</a:t>
             </a:r>
           </a:p>
           <a:p>
             <a:pPr lvl="4"/>
             <a:r>
-              <a:rPr lang="en-US" smtClean="0"/>
+              <a:rPr lang="en-US"/>
               <a:t>Fifth level</a:t>
             </a:r>
             <a:endParaRPr lang="en-US" dirty="0"/>
@@ -1244,7 +1243,7 @@
           <a:p>
             <a:fld id="{ABB0F0B0-6978-4D30-BBCB-4D58ABA24A05}" type="datetimeFigureOut">
               <a:rPr lang="en-US" smtClean="0"/>
-              <a:t>9/27/2018</a:t>
+              <a:t>11/6/18</a:t>
             </a:fld>
             <a:endParaRPr lang="en-US"/>
           </a:p>
@@ -1380,7 +1379,7 @@
           </a:lstStyle>
           <a:p>
             <a:r>
-              <a:rPr lang="en-US" smtClean="0"/>
+              <a:rPr lang="en-US"/>
               <a:t>Click to edit Master title style</a:t>
             </a:r>
             <a:endParaRPr lang="en-US" dirty="0"/>
@@ -1500,7 +1499,7 @@
           <a:p>
             <a:pPr lvl="0"/>
             <a:r>
-              <a:rPr lang="en-US" smtClean="0"/>
+              <a:rPr lang="en-US"/>
               <a:t>Edit Master text styles</a:t>
             </a:r>
           </a:p>
@@ -1523,7 +1522,7 @@
           <a:p>
             <a:fld id="{ABB0F0B0-6978-4D30-BBCB-4D58ABA24A05}" type="datetimeFigureOut">
               <a:rPr lang="en-US" smtClean="0"/>
-              <a:t>9/27/2018</a:t>
+              <a:t>11/6/18</a:t>
             </a:fld>
             <a:endParaRPr lang="en-US"/>
           </a:p>
@@ -1653,7 +1652,7 @@
           <a:lstStyle/>
           <a:p>
             <a:r>
-              <a:rPr lang="en-US" smtClean="0"/>
+              <a:rPr lang="en-US"/>
               <a:t>Click to edit Master title style</a:t>
             </a:r>
             <a:endParaRPr lang="en-US" dirty="0"/>
@@ -1682,35 +1681,35 @@
           <a:p>
             <a:pPr lvl="0"/>
             <a:r>
-              <a:rPr lang="en-US" smtClean="0"/>
+              <a:rPr lang="en-US"/>
               <a:t>Edit Master text styles</a:t>
             </a:r>
           </a:p>
           <a:p>
             <a:pPr lvl="1"/>
             <a:r>
-              <a:rPr lang="en-US" smtClean="0"/>
+              <a:rPr lang="en-US"/>
               <a:t>Second level</a:t>
             </a:r>
           </a:p>
           <a:p>
             <a:pPr lvl="2"/>
             <a:r>
-              <a:rPr lang="en-US" smtClean="0"/>
+              <a:rPr lang="en-US"/>
               <a:t>Third level</a:t>
             </a:r>
           </a:p>
           <a:p>
             <a:pPr lvl="3"/>
             <a:r>
-              <a:rPr lang="en-US" smtClean="0"/>
+              <a:rPr lang="en-US"/>
               <a:t>Fourth level</a:t>
             </a:r>
           </a:p>
           <a:p>
             <a:pPr lvl="4"/>
             <a:r>
-              <a:rPr lang="en-US" smtClean="0"/>
+              <a:rPr lang="en-US"/>
               <a:t>Fifth level</a:t>
             </a:r>
             <a:endParaRPr lang="en-US" dirty="0"/>
@@ -1739,35 +1738,35 @@
           <a:p>
             <a:pPr lvl="0"/>
             <a:r>
-              <a:rPr lang="en-US" smtClean="0"/>
+              <a:rPr lang="en-US"/>
               <a:t>Edit Master text styles</a:t>
             </a:r>
           </a:p>
           <a:p>
             <a:pPr lvl="1"/>
             <a:r>
-              <a:rPr lang="en-US" smtClean="0"/>
+              <a:rPr lang="en-US"/>
               <a:t>Second level</a:t>
             </a:r>
           </a:p>
           <a:p>
             <a:pPr lvl="2"/>
             <a:r>
-              <a:rPr lang="en-US" smtClean="0"/>
+              <a:rPr lang="en-US"/>
               <a:t>Third level</a:t>
             </a:r>
           </a:p>
           <a:p>
             <a:pPr lvl="3"/>
             <a:r>
-              <a:rPr lang="en-US" smtClean="0"/>
+              <a:rPr lang="en-US"/>
               <a:t>Fourth level</a:t>
             </a:r>
           </a:p>
           <a:p>
             <a:pPr lvl="4"/>
             <a:r>
-              <a:rPr lang="en-US" smtClean="0"/>
+              <a:rPr lang="en-US"/>
               <a:t>Fifth level</a:t>
             </a:r>
             <a:endParaRPr lang="en-US" dirty="0"/>
@@ -1791,7 +1790,7 @@
           <a:p>
             <a:fld id="{ABB0F0B0-6978-4D30-BBCB-4D58ABA24A05}" type="datetimeFigureOut">
               <a:rPr lang="en-US" smtClean="0"/>
-              <a:t>9/27/2018</a:t>
+              <a:t>11/6/18</a:t>
             </a:fld>
             <a:endParaRPr lang="en-US"/>
           </a:p>
@@ -1921,7 +1920,7 @@
           <a:lstStyle/>
           <a:p>
             <a:r>
-              <a:rPr lang="en-US" smtClean="0"/>
+              <a:rPr lang="en-US"/>
               <a:t>Click to edit Master title style</a:t>
             </a:r>
             <a:endParaRPr lang="en-US" dirty="0"/>
@@ -1996,7 +1995,7 @@
           <a:p>
             <a:pPr lvl="0"/>
             <a:r>
-              <a:rPr lang="en-US" smtClean="0"/>
+              <a:rPr lang="en-US"/>
               <a:t>Edit Master text styles</a:t>
             </a:r>
           </a:p>
@@ -2024,35 +2023,35 @@
           <a:p>
             <a:pPr lvl="0"/>
             <a:r>
-              <a:rPr lang="en-US" smtClean="0"/>
+              <a:rPr lang="en-US"/>
               <a:t>Edit Master text styles</a:t>
             </a:r>
           </a:p>
           <a:p>
             <a:pPr lvl="1"/>
             <a:r>
-              <a:rPr lang="en-US" smtClean="0"/>
+              <a:rPr lang="en-US"/>
               <a:t>Second level</a:t>
             </a:r>
           </a:p>
           <a:p>
             <a:pPr lvl="2"/>
             <a:r>
-              <a:rPr lang="en-US" smtClean="0"/>
+              <a:rPr lang="en-US"/>
               <a:t>Third level</a:t>
             </a:r>
           </a:p>
           <a:p>
             <a:pPr lvl="3"/>
             <a:r>
-              <a:rPr lang="en-US" smtClean="0"/>
+              <a:rPr lang="en-US"/>
               <a:t>Fourth level</a:t>
             </a:r>
           </a:p>
           <a:p>
             <a:pPr lvl="4"/>
             <a:r>
-              <a:rPr lang="en-US" smtClean="0"/>
+              <a:rPr lang="en-US"/>
               <a:t>Fifth level</a:t>
             </a:r>
             <a:endParaRPr lang="en-US" dirty="0"/>
@@ -2127,7 +2126,7 @@
           <a:p>
             <a:pPr lvl="0"/>
             <a:r>
-              <a:rPr lang="en-US" smtClean="0"/>
+              <a:rPr lang="en-US"/>
               <a:t>Edit Master text styles</a:t>
             </a:r>
           </a:p>
@@ -2155,35 +2154,35 @@
           <a:p>
             <a:pPr lvl="0"/>
             <a:r>
-              <a:rPr lang="en-US" smtClean="0"/>
+              <a:rPr lang="en-US"/>
               <a:t>Edit Master text styles</a:t>
             </a:r>
           </a:p>
           <a:p>
             <a:pPr lvl="1"/>
             <a:r>
-              <a:rPr lang="en-US" smtClean="0"/>
+              <a:rPr lang="en-US"/>
               <a:t>Second level</a:t>
             </a:r>
           </a:p>
           <a:p>
             <a:pPr lvl="2"/>
             <a:r>
-              <a:rPr lang="en-US" smtClean="0"/>
+              <a:rPr lang="en-US"/>
               <a:t>Third level</a:t>
             </a:r>
           </a:p>
           <a:p>
             <a:pPr lvl="3"/>
             <a:r>
-              <a:rPr lang="en-US" smtClean="0"/>
+              <a:rPr lang="en-US"/>
               <a:t>Fourth level</a:t>
             </a:r>
           </a:p>
           <a:p>
             <a:pPr lvl="4"/>
             <a:r>
-              <a:rPr lang="en-US" smtClean="0"/>
+              <a:rPr lang="en-US"/>
               <a:t>Fifth level</a:t>
             </a:r>
             <a:endParaRPr lang="en-US" dirty="0"/>
@@ -2207,7 +2206,7 @@
           <a:p>
             <a:fld id="{ABB0F0B0-6978-4D30-BBCB-4D58ABA24A05}" type="datetimeFigureOut">
               <a:rPr lang="en-US" smtClean="0"/>
-              <a:t>9/27/2018</a:t>
+              <a:t>11/6/18</a:t>
             </a:fld>
             <a:endParaRPr lang="en-US"/>
           </a:p>
@@ -2332,7 +2331,7 @@
           <a:lstStyle/>
           <a:p>
             <a:r>
-              <a:rPr lang="en-US" smtClean="0"/>
+              <a:rPr lang="en-US"/>
               <a:t>Click to edit Master title style</a:t>
             </a:r>
             <a:endParaRPr lang="en-US" dirty="0"/>
@@ -2356,7 +2355,7 @@
           <a:p>
             <a:fld id="{ABB0F0B0-6978-4D30-BBCB-4D58ABA24A05}" type="datetimeFigureOut">
               <a:rPr lang="en-US" smtClean="0"/>
-              <a:t>9/27/2018</a:t>
+              <a:t>11/6/18</a:t>
             </a:fld>
             <a:endParaRPr lang="en-US"/>
           </a:p>
@@ -2482,7 +2481,7 @@
           <a:p>
             <a:fld id="{ABB0F0B0-6978-4D30-BBCB-4D58ABA24A05}" type="datetimeFigureOut">
               <a:rPr lang="en-US" smtClean="0"/>
-              <a:t>9/27/2018</a:t>
+              <a:t>11/6/18</a:t>
             </a:fld>
             <a:endParaRPr lang="en-US"/>
           </a:p>
@@ -2587,7 +2586,7 @@
           </a:lstStyle>
           <a:p>
             <a:r>
-              <a:rPr lang="en-US" smtClean="0"/>
+              <a:rPr lang="en-US"/>
               <a:t>Click to edit Master title style</a:t>
             </a:r>
             <a:endParaRPr lang="en-US" dirty="0"/>
@@ -2616,35 +2615,35 @@
           <a:p>
             <a:pPr lvl="0"/>
             <a:r>
-              <a:rPr lang="en-US" smtClean="0"/>
+              <a:rPr lang="en-US"/>
               <a:t>Edit Master text styles</a:t>
             </a:r>
           </a:p>
           <a:p>
             <a:pPr lvl="1"/>
             <a:r>
-              <a:rPr lang="en-US" smtClean="0"/>
+              <a:rPr lang="en-US"/>
               <a:t>Second level</a:t>
             </a:r>
           </a:p>
           <a:p>
             <a:pPr lvl="2"/>
             <a:r>
-              <a:rPr lang="en-US" smtClean="0"/>
+              <a:rPr lang="en-US"/>
               <a:t>Third level</a:t>
             </a:r>
           </a:p>
           <a:p>
             <a:pPr lvl="3"/>
             <a:r>
-              <a:rPr lang="en-US" smtClean="0"/>
+              <a:rPr lang="en-US"/>
               <a:t>Fourth level</a:t>
             </a:r>
           </a:p>
           <a:p>
             <a:pPr lvl="4"/>
             <a:r>
-              <a:rPr lang="en-US" smtClean="0"/>
+              <a:rPr lang="en-US"/>
               <a:t>Fifth level</a:t>
             </a:r>
             <a:endParaRPr lang="en-US" dirty="0"/>
@@ -2710,7 +2709,7 @@
           <a:p>
             <a:pPr lvl="0"/>
             <a:r>
-              <a:rPr lang="en-US" smtClean="0"/>
+              <a:rPr lang="en-US"/>
               <a:t>Edit Master text styles</a:t>
             </a:r>
           </a:p>
@@ -2733,7 +2732,7 @@
           <a:p>
             <a:fld id="{ABB0F0B0-6978-4D30-BBCB-4D58ABA24A05}" type="datetimeFigureOut">
               <a:rPr lang="en-US" smtClean="0"/>
-              <a:t>9/27/2018</a:t>
+              <a:t>11/6/18</a:t>
             </a:fld>
             <a:endParaRPr lang="en-US"/>
           </a:p>
@@ -3003,7 +3002,7 @@
           </a:lstStyle>
           <a:p>
             <a:r>
-              <a:rPr lang="en-US" smtClean="0"/>
+              <a:rPr lang="en-US"/>
               <a:t>Click to edit Master title style</a:t>
             </a:r>
             <a:endParaRPr lang="en-US" dirty="0"/>
@@ -3078,7 +3077,7 @@
           </a:lstStyle>
           <a:p>
             <a:r>
-              <a:rPr lang="en-US" smtClean="0"/>
+              <a:rPr lang="en-US"/>
               <a:t>Click icon to add picture</a:t>
             </a:r>
             <a:endParaRPr lang="en-US" dirty="0"/>
@@ -3146,7 +3145,7 @@
           <a:p>
             <a:pPr lvl="0"/>
             <a:r>
-              <a:rPr lang="en-US" smtClean="0"/>
+              <a:rPr lang="en-US"/>
               <a:t>Edit Master text styles</a:t>
             </a:r>
           </a:p>
@@ -3178,7 +3177,7 @@
           <a:p>
             <a:fld id="{ABB0F0B0-6978-4D30-BBCB-4D58ABA24A05}" type="datetimeFigureOut">
               <a:rPr lang="en-US" smtClean="0"/>
-              <a:t>9/27/2018</a:t>
+              <a:t>11/6/18</a:t>
             </a:fld>
             <a:endParaRPr lang="en-US"/>
           </a:p>
@@ -3401,7 +3400,7 @@
           <a:lstStyle/>
           <a:p>
             <a:r>
-              <a:rPr lang="en-US" smtClean="0"/>
+              <a:rPr lang="en-US"/>
               <a:t>Click to edit Master title style</a:t>
             </a:r>
             <a:endParaRPr lang="en-US" dirty="0"/>
@@ -3504,7 +3503,7 @@
           <a:p>
             <a:fld id="{ABB0F0B0-6978-4D30-BBCB-4D58ABA24A05}" type="datetimeFigureOut">
               <a:rPr lang="en-US" smtClean="0"/>
-              <a:t>9/27/2018</a:t>
+              <a:t>11/6/18</a:t>
             </a:fld>
             <a:endParaRPr lang="en-US"/>
           </a:p>
@@ -4014,15 +4013,7 @@
           <a:p>
             <a:r>
               <a:rPr lang="en-US" dirty="0"/>
-              <a:t>U</a:t>
-            </a:r>
-            <a:r>
-              <a:rPr lang="en-US" dirty="0" smtClean="0"/>
-              <a:t>ser </a:t>
-            </a:r>
-            <a:r>
-              <a:rPr lang="en-US" dirty="0"/>
-              <a:t>Stories for Progression Tracking </a:t>
+              <a:t>User Stories for Progression Tracking </a:t>
             </a:r>
             <a:br>
               <a:rPr lang="en-US" dirty="0"/>
@@ -4062,28 +4053,28 @@
           <a:p>
             <a:pPr algn="l"/>
             <a:r>
-              <a:rPr lang="en-US" dirty="0" smtClean="0"/>
+              <a:rPr lang="en-US" dirty="0"/>
               <a:t>Coconut  Team,</a:t>
             </a:r>
           </a:p>
           <a:p>
             <a:pPr algn="l"/>
             <a:r>
-              <a:rPr lang="en-US" dirty="0" smtClean="0"/>
+              <a:rPr lang="en-US" dirty="0"/>
               <a:t>WILLIAM Wanger &amp; MANAR Alkayed</a:t>
             </a:r>
           </a:p>
           <a:p>
             <a:pPr algn="l"/>
             <a:r>
-              <a:rPr lang="en-US" dirty="0" smtClean="0"/>
+              <a:rPr lang="en-US" dirty="0"/>
               <a:t>27/9/2018</a:t>
             </a:r>
           </a:p>
           <a:p>
             <a:pPr algn="l"/>
             <a:r>
-              <a:rPr lang="en-US" dirty="0" smtClean="0">
+              <a:rPr lang="en-US" dirty="0">
                 <a:solidFill>
                   <a:schemeClr val="bg1">
                     <a:lumMod val="75000"/>
@@ -4095,7 +4086,7 @@
           </a:p>
           <a:p>
             <a:pPr algn="l"/>
-            <a:endParaRPr lang="en-US" dirty="0" smtClean="0"/>
+            <a:endParaRPr lang="en-US" dirty="0"/>
           </a:p>
           <a:p>
             <a:pPr algn="l"/>
@@ -4190,18 +4181,9 @@
           <a:lstStyle/>
           <a:p>
             <a:r>
-              <a:rPr lang="en-US" dirty="0" smtClean="0"/>
-              <a:t>Story 8:</a:t>
-            </a:r>
-            <a:r>
-              <a:rPr lang="en-US" dirty="0"/>
-              <a:t>P</a:t>
-            </a:r>
-            <a:r>
-              <a:rPr lang="en-US" dirty="0" smtClean="0"/>
-              <a:t>layer Report</a:t>
-            </a:r>
-            <a:endParaRPr lang="en-US" dirty="0"/>
+              <a:rPr lang="en-US" dirty="0"/>
+              <a:t>Story 8:Player Report</a:t>
+            </a:r>
           </a:p>
         </p:txBody>
       </p:sp>
@@ -4230,12 +4212,8 @@
               <a:buAutoNum type="alphaUcPeriod"/>
             </a:pPr>
             <a:r>
-              <a:rPr lang="en-US" dirty="0" smtClean="0"/>
-              <a:t>Description</a:t>
-            </a:r>
-            <a:r>
-              <a:rPr lang="en-US" dirty="0"/>
-              <a:t>: Screen for developer to request Player Report</a:t>
+              <a:rPr lang="en-US" dirty="0"/>
+              <a:t>Description: Screen for developer to request Player Report</a:t>
             </a:r>
           </a:p>
           <a:p>
@@ -4274,7 +4252,7 @@
               <a:buAutoNum type="alphaUcPeriod"/>
             </a:pPr>
             <a:r>
-              <a:rPr lang="en-US" dirty="0" smtClean="0"/>
+              <a:rPr lang="en-US" dirty="0"/>
               <a:t>Importance </a:t>
             </a:r>
             <a:r>
@@ -4288,12 +4266,8 @@
               <a:buAutoNum type="alphaUcPeriod"/>
             </a:pPr>
             <a:r>
-              <a:rPr lang="en-US" dirty="0" smtClean="0"/>
-              <a:t>Time </a:t>
-            </a:r>
-            <a:r>
-              <a:rPr lang="en-US" dirty="0"/>
-              <a:t>required: </a:t>
+              <a:rPr lang="en-US" dirty="0"/>
+              <a:t>Time required: </a:t>
             </a:r>
             <a:r>
               <a:rPr lang="en-US" b="1" u="sng" dirty="0"/>
@@ -4348,10 +4322,9 @@
           <a:lstStyle/>
           <a:p>
             <a:r>
-              <a:rPr lang="en-US" dirty="0" smtClean="0"/>
+              <a:rPr lang="en-US" dirty="0"/>
               <a:t>Story 9:Game Report</a:t>
             </a:r>
-            <a:endParaRPr lang="en-US" dirty="0"/>
           </a:p>
         </p:txBody>
       </p:sp>
@@ -4375,12 +4348,8 @@
               <a:buAutoNum type="alphaUcPeriod"/>
             </a:pPr>
             <a:r>
-              <a:rPr lang="en-US" dirty="0" smtClean="0"/>
-              <a:t> </a:t>
-            </a:r>
-            <a:r>
-              <a:rPr lang="en-US" dirty="0"/>
-              <a:t>Description: Screen for developer to request Game Report</a:t>
+              <a:rPr lang="en-US" dirty="0"/>
+              <a:t> Description: Screen for developer to request Game Report</a:t>
             </a:r>
           </a:p>
           <a:p>
@@ -4389,12 +4358,8 @@
               <a:buAutoNum type="romanUcPeriod"/>
             </a:pPr>
             <a:r>
-              <a:rPr lang="en-US" dirty="0" smtClean="0"/>
-              <a:t>Number </a:t>
-            </a:r>
-            <a:r>
-              <a:rPr lang="en-US" dirty="0"/>
-              <a:t>of Players</a:t>
+              <a:rPr lang="en-US" dirty="0"/>
+              <a:t>Number of Players</a:t>
             </a:r>
           </a:p>
           <a:p>
@@ -4404,15 +4369,7 @@
             </a:pPr>
             <a:r>
               <a:rPr lang="en-US" dirty="0"/>
-              <a:t> </a:t>
-            </a:r>
-            <a:r>
-              <a:rPr lang="en-US" dirty="0" smtClean="0"/>
-              <a:t>Number </a:t>
-            </a:r>
-            <a:r>
-              <a:rPr lang="en-US" dirty="0"/>
-              <a:t>of characters</a:t>
+              <a:t> Number of characters</a:t>
             </a:r>
           </a:p>
           <a:p>
@@ -4422,15 +4379,7 @@
             </a:pPr>
             <a:r>
               <a:rPr lang="en-US" dirty="0"/>
-              <a:t> </a:t>
-            </a:r>
-            <a:r>
-              <a:rPr lang="en-US" dirty="0" smtClean="0"/>
-              <a:t>Average </a:t>
-            </a:r>
-            <a:r>
-              <a:rPr lang="en-US" dirty="0"/>
-              <a:t>Time of Player</a:t>
+              <a:t> Average Time of Player</a:t>
             </a:r>
           </a:p>
           <a:p>
@@ -4449,22 +4398,13 @@
               <a:buAutoNum type="alphaUcPeriod"/>
             </a:pPr>
             <a:r>
-              <a:rPr lang="en-US" dirty="0" smtClean="0"/>
-              <a:t> </a:t>
-            </a:r>
-            <a:r>
-              <a:rPr lang="en-US" dirty="0"/>
-              <a:t>Importance </a:t>
-            </a:r>
-            <a:r>
-              <a:rPr lang="en-US" dirty="0" smtClean="0"/>
-              <a:t>:</a:t>
-            </a:r>
-            <a:r>
-              <a:rPr lang="en-US" b="1" u="sng" dirty="0" smtClean="0"/>
+              <a:rPr lang="en-US" dirty="0"/>
+              <a:t> Importance :</a:t>
+            </a:r>
+            <a:r>
+              <a:rPr lang="en-US" b="1" u="sng" dirty="0"/>
               <a:t>20</a:t>
             </a:r>
-            <a:endParaRPr lang="en-US" b="1" u="sng" dirty="0"/>
           </a:p>
           <a:p>
             <a:pPr marL="514350" indent="-514350">
@@ -4472,12 +4412,8 @@
               <a:buAutoNum type="alphaUcPeriod"/>
             </a:pPr>
             <a:r>
-              <a:rPr lang="en-US" dirty="0" smtClean="0"/>
-              <a:t>Time </a:t>
-            </a:r>
-            <a:r>
-              <a:rPr lang="en-US" dirty="0"/>
-              <a:t>required: </a:t>
+              <a:rPr lang="en-US" dirty="0"/>
+              <a:t>Time required: </a:t>
             </a:r>
             <a:r>
               <a:rPr lang="en-US" b="1" u="sng" dirty="0"/>
@@ -4532,10 +4468,9 @@
           <a:lstStyle/>
           <a:p>
             <a:r>
-              <a:rPr lang="en-US" dirty="0" smtClean="0"/>
+              <a:rPr lang="en-US" dirty="0"/>
               <a:t>Story10:Items Report</a:t>
             </a:r>
-            <a:endParaRPr lang="en-US" dirty="0"/>
           </a:p>
         </p:txBody>
       </p:sp>
@@ -4561,20 +4496,8 @@
               <a:buAutoNum type="alphaUcPeriod"/>
             </a:pPr>
             <a:r>
-              <a:rPr lang="en-US" dirty="0" smtClean="0"/>
-              <a:t>Description</a:t>
-            </a:r>
-            <a:r>
-              <a:rPr lang="en-US" dirty="0"/>
-              <a:t>: Sub Screen below Player or Game report for developer to request </a:t>
-            </a:r>
-            <a:r>
-              <a:rPr lang="en-US" dirty="0" smtClean="0"/>
-              <a:t>Items </a:t>
-            </a:r>
-            <a:r>
-              <a:rPr lang="en-US" dirty="0"/>
-              <a:t>Report</a:t>
+              <a:rPr lang="en-US" dirty="0"/>
+              <a:t>Description: Sub Screen below Player or Game report for developer to request Items Report</a:t>
             </a:r>
           </a:p>
           <a:p>
@@ -4586,12 +4509,8 @@
               <a:buAutoNum type="romanUcPeriod"/>
             </a:pPr>
             <a:r>
-              <a:rPr lang="en-US" dirty="0" smtClean="0"/>
-              <a:t>Number </a:t>
-            </a:r>
-            <a:r>
-              <a:rPr lang="en-US" dirty="0"/>
-              <a:t>of Items</a:t>
+              <a:rPr lang="en-US" dirty="0"/>
+              <a:t>Number of Items</a:t>
             </a:r>
           </a:p>
           <a:p>
@@ -4604,15 +4523,7 @@
             </a:pPr>
             <a:r>
               <a:rPr lang="en-US" dirty="0"/>
-              <a:t> </a:t>
-            </a:r>
-            <a:r>
-              <a:rPr lang="en-US" dirty="0" smtClean="0"/>
-              <a:t>Average Value </a:t>
-            </a:r>
-            <a:r>
-              <a:rPr lang="en-US" dirty="0"/>
-              <a:t>of Items</a:t>
+              <a:t> Average Value of Items</a:t>
             </a:r>
           </a:p>
           <a:p>
@@ -4625,19 +4536,7 @@
             </a:pPr>
             <a:r>
               <a:rPr lang="en-US" dirty="0"/>
-              <a:t> </a:t>
-            </a:r>
-            <a:r>
-              <a:rPr lang="en-US" dirty="0" smtClean="0"/>
-              <a:t>Average </a:t>
-            </a:r>
-            <a:r>
-              <a:rPr lang="en-US" dirty="0"/>
-              <a:t>Time of </a:t>
-            </a:r>
-            <a:r>
-              <a:rPr lang="en-US" dirty="0" smtClean="0"/>
-              <a:t>Player</a:t>
+              <a:t> Average Time of Player</a:t>
             </a:r>
           </a:p>
           <a:p>
@@ -4649,12 +4548,8 @@
               <a:buAutoNum type="romanUcPeriod"/>
             </a:pPr>
             <a:r>
-              <a:rPr lang="en-US" dirty="0" smtClean="0"/>
-              <a:t>Basic </a:t>
-            </a:r>
-            <a:r>
-              <a:rPr lang="en-US" dirty="0"/>
-              <a:t>Info Above</a:t>
+              <a:rPr lang="en-US" dirty="0"/>
+              <a:t>Basic Info Above</a:t>
             </a:r>
           </a:p>
           <a:p>
@@ -4663,14 +4558,13 @@
               <a:buAutoNum type="alphaUcPeriod"/>
             </a:pPr>
             <a:r>
-              <a:rPr lang="en-US" dirty="0" smtClean="0"/>
+              <a:rPr lang="en-US" dirty="0"/>
               <a:t>Importance : </a:t>
             </a:r>
             <a:r>
-              <a:rPr lang="en-US" b="1" u="sng" dirty="0" smtClean="0"/>
+              <a:rPr lang="en-US" b="1" u="sng" dirty="0"/>
               <a:t>20</a:t>
             </a:r>
-            <a:endParaRPr lang="en-US" b="1" u="sng" dirty="0"/>
           </a:p>
           <a:p>
             <a:pPr marL="514350" indent="-514350">
@@ -4678,12 +4572,8 @@
               <a:buAutoNum type="alphaUcPeriod"/>
             </a:pPr>
             <a:r>
-              <a:rPr lang="en-US" dirty="0" smtClean="0"/>
-              <a:t>Time </a:t>
-            </a:r>
-            <a:r>
-              <a:rPr lang="en-US" dirty="0"/>
-              <a:t>required: </a:t>
+              <a:rPr lang="en-US" dirty="0"/>
+              <a:t>Time required: </a:t>
             </a:r>
             <a:r>
               <a:rPr lang="en-US" b="1" u="sng" dirty="0"/>
@@ -4741,11 +4631,11 @@
           <a:lstStyle/>
           <a:p>
             <a:r>
-              <a:rPr lang="en-US" dirty="0" smtClean="0"/>
+              <a:rPr lang="en-US" dirty="0"/>
               <a:t>Story 11:Progression Report</a:t>
             </a:r>
             <a:br>
-              <a:rPr lang="en-US" dirty="0" smtClean="0"/>
+              <a:rPr lang="en-US" dirty="0"/>
             </a:br>
             <a:endParaRPr lang="en-US" dirty="0"/>
           </a:p>
@@ -4773,12 +4663,8 @@
               <a:buAutoNum type="alphaUcPeriod"/>
             </a:pPr>
             <a:r>
-              <a:rPr lang="en-US" dirty="0" smtClean="0"/>
-              <a:t>Description</a:t>
-            </a:r>
-            <a:r>
-              <a:rPr lang="en-US" dirty="0"/>
-              <a:t>: Sub Screen below Player or Game report for developer to request </a:t>
+              <a:rPr lang="en-US" dirty="0"/>
+              <a:t>Description: Sub Screen below Player or Game report for developer to request </a:t>
             </a:r>
           </a:p>
           <a:p>
@@ -4803,12 +4689,8 @@
               <a:buAutoNum type="romanUcPeriod"/>
             </a:pPr>
             <a:r>
-              <a:rPr lang="en-US" sz="2600" dirty="0" smtClean="0"/>
-              <a:t>Number </a:t>
-            </a:r>
-            <a:r>
               <a:rPr lang="en-US" sz="2600" dirty="0"/>
-              <a:t>of Trophies</a:t>
+              <a:t>Number of Trophies</a:t>
             </a:r>
           </a:p>
           <a:p>
@@ -4834,19 +4716,7 @@
             </a:pPr>
             <a:r>
               <a:rPr lang="en-US" sz="2600" dirty="0"/>
-              <a:t> </a:t>
-            </a:r>
-            <a:r>
-              <a:rPr lang="en-US" sz="2600" dirty="0" smtClean="0"/>
-              <a:t>Average Time </a:t>
-            </a:r>
-            <a:r>
-              <a:rPr lang="en-US" sz="2600" dirty="0"/>
-              <a:t>to a given </a:t>
-            </a:r>
-            <a:r>
-              <a:rPr lang="en-US" sz="2600" dirty="0" smtClean="0"/>
-              <a:t>Trophy</a:t>
+              <a:t> Average Time to a given Trophy</a:t>
             </a:r>
           </a:p>
           <a:p>
@@ -4858,16 +4728,8 @@
               <a:buAutoNum type="romanUcPeriod"/>
             </a:pPr>
             <a:r>
-              <a:rPr lang="en-US" dirty="0" smtClean="0"/>
-              <a:t>Specific </a:t>
-            </a:r>
-            <a:r>
-              <a:rPr lang="en-US" dirty="0"/>
-              <a:t>Trophy </a:t>
-            </a:r>
-            <a:r>
-              <a:rPr lang="en-US" dirty="0" smtClean="0"/>
-              <a:t>Stats</a:t>
+              <a:rPr lang="en-US" dirty="0"/>
+              <a:t>Specific Trophy Stats</a:t>
             </a:r>
           </a:p>
           <a:p>
@@ -4879,16 +4741,8 @@
               <a:buAutoNum type="romanUcPeriod"/>
             </a:pPr>
             <a:r>
-              <a:rPr lang="en-US" dirty="0" smtClean="0"/>
-              <a:t>Basic </a:t>
-            </a:r>
-            <a:r>
-              <a:rPr lang="en-US" dirty="0"/>
-              <a:t>Info </a:t>
-            </a:r>
-            <a:r>
-              <a:rPr lang="en-US" dirty="0" smtClean="0"/>
-              <a:t>Above</a:t>
+              <a:rPr lang="en-US" dirty="0"/>
+              <a:t>Basic Info Above</a:t>
             </a:r>
           </a:p>
           <a:p>
@@ -4900,7 +4754,7 @@
               <a:buAutoNum type="alphaUcPeriod"/>
             </a:pPr>
             <a:r>
-              <a:rPr lang="en-US" dirty="0" smtClean="0"/>
+              <a:rPr lang="en-US" dirty="0"/>
               <a:t>Importance: </a:t>
             </a:r>
             <a:r>
@@ -4917,12 +4771,8 @@
               <a:buAutoNum type="alphaUcPeriod"/>
             </a:pPr>
             <a:r>
-              <a:rPr lang="en-US" dirty="0" smtClean="0"/>
-              <a:t>Time </a:t>
-            </a:r>
-            <a:r>
-              <a:rPr lang="en-US" dirty="0"/>
-              <a:t>required: </a:t>
+              <a:rPr lang="en-US" dirty="0"/>
+              <a:t>Time required: </a:t>
             </a:r>
             <a:r>
               <a:rPr lang="en-US" sz="2200" b="1" u="sng" dirty="0"/>
@@ -4986,10 +4836,9 @@
           <a:p>
             <a:pPr algn="ctr"/>
             <a:r>
-              <a:rPr lang="en-US" dirty="0" smtClean="0"/>
+              <a:rPr lang="en-US" dirty="0"/>
               <a:t>Thank you </a:t>
             </a:r>
-            <a:endParaRPr lang="en-US" dirty="0"/>
           </a:p>
         </p:txBody>
       </p:sp>
@@ -5075,13 +4924,8 @@
           <a:p>
             <a:r>
               <a:rPr lang="en-US" dirty="0"/>
-              <a:t>Main </a:t>
-            </a:r>
-            <a:r>
-              <a:rPr lang="en-US" dirty="0" smtClean="0"/>
-              <a:t>Stakeholder</a:t>
-            </a:r>
-            <a:endParaRPr lang="en-US" dirty="0"/>
+              <a:t>Main Stakeholder</a:t>
+            </a:r>
           </a:p>
         </p:txBody>
       </p:sp>
@@ -5110,10 +4954,9 @@
               <a:buAutoNum type="alphaUcPeriod"/>
             </a:pPr>
             <a:r>
-              <a:rPr lang="en-US" dirty="0" smtClean="0"/>
+              <a:rPr lang="en-US" dirty="0"/>
               <a:t>Game Developer</a:t>
             </a:r>
-            <a:endParaRPr lang="en-US" dirty="0"/>
           </a:p>
         </p:txBody>
       </p:sp>
@@ -5140,16 +4983,12 @@
           <a:lstStyle/>
           <a:p>
             <a:r>
-              <a:rPr lang="en-US" b="1" dirty="0" smtClean="0"/>
+              <a:rPr lang="en-US" b="1" dirty="0"/>
               <a:t>GIT Repository : </a:t>
             </a:r>
             <a:r>
-              <a:rPr lang="en-US" dirty="0" smtClean="0"/>
-              <a:t>https</a:t>
-            </a:r>
-            <a:r>
-              <a:rPr lang="en-US" dirty="0"/>
-              <a:t>://github.com/WillWagnerIV/The-Coconuts</a:t>
+              <a:rPr lang="en-US" dirty="0"/>
+              <a:t>https://github.com/WillWagnerIV/The-Coconuts</a:t>
             </a:r>
           </a:p>
         </p:txBody>
@@ -5200,10 +5039,9 @@
           <a:lstStyle/>
           <a:p>
             <a:r>
-              <a:rPr lang="en-US" dirty="0" smtClean="0"/>
+              <a:rPr lang="en-US" dirty="0"/>
               <a:t>Story 1:User Register</a:t>
             </a:r>
-            <a:endParaRPr lang="en-US" dirty="0"/>
           </a:p>
         </p:txBody>
       </p:sp>
@@ -5227,16 +5065,8 @@
               <a:buAutoNum type="alphaUcPeriod"/>
             </a:pPr>
             <a:r>
-              <a:rPr lang="en-US" dirty="0" smtClean="0"/>
-              <a:t> </a:t>
-            </a:r>
-            <a:r>
-              <a:rPr lang="en-US" dirty="0"/>
-              <a:t>Description: Registration screen for the developer to access the </a:t>
-            </a:r>
-            <a:r>
-              <a:rPr lang="en-US" dirty="0" smtClean="0"/>
-              <a:t>system</a:t>
+              <a:rPr lang="en-US" dirty="0"/>
+              <a:t>As a user I want to be able to sign in to be able to access and use the system.</a:t>
             </a:r>
           </a:p>
           <a:p>
@@ -5245,7 +5075,7 @@
               <a:buAutoNum type="romanUcPeriod"/>
             </a:pPr>
             <a:r>
-              <a:rPr lang="en-US" dirty="0" smtClean="0"/>
+              <a:rPr lang="en-US" dirty="0"/>
               <a:t>Username</a:t>
             </a:r>
           </a:p>
@@ -5255,10 +5085,9 @@
               <a:buAutoNum type="romanUcPeriod"/>
             </a:pPr>
             <a:r>
-              <a:rPr lang="en-US" dirty="0" smtClean="0"/>
+              <a:rPr lang="en-US" dirty="0"/>
               <a:t>Password</a:t>
             </a:r>
-            <a:endParaRPr lang="en-US" dirty="0"/>
           </a:p>
           <a:p>
             <a:pPr marL="514350" indent="-514350">
@@ -5266,14 +5095,13 @@
               <a:buAutoNum type="alphaUcPeriod"/>
             </a:pPr>
             <a:r>
-              <a:rPr lang="en-US" dirty="0" smtClean="0"/>
+              <a:rPr lang="en-US" dirty="0"/>
               <a:t>Importance :</a:t>
             </a:r>
             <a:r>
               <a:rPr lang="en-US" b="1" u="sng" dirty="0"/>
               <a:t>20</a:t>
             </a:r>
-            <a:endParaRPr lang="en-US" b="1" u="sng" dirty="0"/>
           </a:p>
           <a:p>
             <a:pPr marL="514350" indent="-514350">
@@ -5281,12 +5109,8 @@
               <a:buAutoNum type="alphaUcPeriod"/>
             </a:pPr>
             <a:r>
-              <a:rPr lang="en-US" dirty="0" smtClean="0"/>
-              <a:t>Time </a:t>
-            </a:r>
-            <a:r>
-              <a:rPr lang="en-US" dirty="0"/>
-              <a:t>required: </a:t>
+              <a:rPr lang="en-US" dirty="0"/>
+              <a:t>Time required: </a:t>
             </a:r>
             <a:r>
               <a:rPr lang="en-US" b="1" u="sng" dirty="0"/>
@@ -5341,10 +5165,9 @@
           <a:lstStyle/>
           <a:p>
             <a:r>
-              <a:rPr lang="en-US" dirty="0" smtClean="0"/>
+              <a:rPr lang="en-US" dirty="0"/>
               <a:t>Story 2:User Login</a:t>
             </a:r>
-            <a:endParaRPr lang="en-US" dirty="0"/>
           </a:p>
         </p:txBody>
       </p:sp>
@@ -5368,12 +5191,8 @@
               <a:buAutoNum type="alphaUcPeriod"/>
             </a:pPr>
             <a:r>
-              <a:rPr lang="en-US" dirty="0" smtClean="0"/>
-              <a:t>Description </a:t>
-            </a:r>
-            <a:r>
-              <a:rPr lang="en-US" dirty="0"/>
-              <a:t>Login screen for a registered user</a:t>
+              <a:rPr lang="en-US" dirty="0"/>
+              <a:t>Description Login screen for a registered user</a:t>
             </a:r>
           </a:p>
           <a:p>
@@ -5382,7 +5201,7 @@
               <a:buAutoNum type="alphaUcPeriod"/>
             </a:pPr>
             <a:r>
-              <a:rPr lang="en-US" dirty="0" smtClean="0"/>
+              <a:rPr lang="en-US" dirty="0"/>
               <a:t>Importance: </a:t>
             </a:r>
             <a:r>
@@ -5396,12 +5215,8 @@
               <a:buAutoNum type="alphaUcPeriod"/>
             </a:pPr>
             <a:r>
-              <a:rPr lang="en-US" dirty="0" smtClean="0"/>
-              <a:t>Time </a:t>
-            </a:r>
-            <a:r>
-              <a:rPr lang="en-US" dirty="0"/>
-              <a:t>required: </a:t>
+              <a:rPr lang="en-US" dirty="0"/>
+              <a:t>Time required: </a:t>
             </a:r>
             <a:r>
               <a:rPr lang="en-US" b="1" u="sng" dirty="0"/>
@@ -5456,10 +5271,9 @@
           <a:lstStyle/>
           <a:p>
             <a:r>
-              <a:rPr lang="en-US" dirty="0" smtClean="0"/>
+              <a:rPr lang="en-US" dirty="0"/>
               <a:t>Story 3:User Forgot Credentials</a:t>
             </a:r>
-            <a:endParaRPr lang="en-US" dirty="0"/>
           </a:p>
         </p:txBody>
       </p:sp>
@@ -5483,16 +5297,8 @@
               <a:buAutoNum type="alphaUcPeriod"/>
             </a:pPr>
             <a:r>
-              <a:rPr lang="en-US" dirty="0" smtClean="0"/>
-              <a:t>Description </a:t>
-            </a:r>
-            <a:r>
-              <a:rPr lang="en-US" dirty="0"/>
-              <a:t>Offer to help the user retrieve their </a:t>
-            </a:r>
-            <a:r>
-              <a:rPr lang="en-US" dirty="0" smtClean="0"/>
-              <a:t>info</a:t>
+              <a:rPr lang="en-US" dirty="0"/>
+              <a:t>Description Offer to help the user retrieve their info</a:t>
             </a:r>
           </a:p>
           <a:p>
@@ -5502,11 +5308,7 @@
             </a:pPr>
             <a:r>
               <a:rPr lang="en-US" dirty="0"/>
-              <a:t>Email </a:t>
-            </a:r>
-            <a:r>
-              <a:rPr lang="en-US" dirty="0" smtClean="0"/>
-              <a:t>(?)</a:t>
+              <a:t>Email (?)</a:t>
             </a:r>
           </a:p>
           <a:p>
@@ -5516,15 +5318,7 @@
             </a:pPr>
             <a:r>
               <a:rPr lang="en-US" dirty="0"/>
-              <a:t>T</a:t>
-            </a:r>
-            <a:r>
-              <a:rPr lang="en-US" dirty="0" smtClean="0"/>
-              <a:t>est </a:t>
-            </a:r>
-            <a:r>
-              <a:rPr lang="en-US" dirty="0"/>
-              <a:t>question (?)</a:t>
+              <a:t>Test question (?)</a:t>
             </a:r>
           </a:p>
           <a:p>
@@ -5533,14 +5327,13 @@
               <a:buAutoNum type="alphaUcPeriod"/>
             </a:pPr>
             <a:r>
-              <a:rPr lang="en-US" dirty="0" smtClean="0"/>
+              <a:rPr lang="en-US" dirty="0"/>
               <a:t>Importance : </a:t>
             </a:r>
             <a:r>
-              <a:rPr lang="en-US" b="1" u="sng" dirty="0" smtClean="0"/>
+              <a:rPr lang="en-US" b="1" u="sng" dirty="0"/>
               <a:t>20</a:t>
             </a:r>
-            <a:endParaRPr lang="en-US" b="1" u="sng" dirty="0"/>
           </a:p>
           <a:p>
             <a:pPr marL="514350" indent="-514350">
@@ -5548,12 +5341,8 @@
               <a:buAutoNum type="alphaUcPeriod"/>
             </a:pPr>
             <a:r>
-              <a:rPr lang="en-US" dirty="0" smtClean="0"/>
-              <a:t>Time </a:t>
-            </a:r>
-            <a:r>
-              <a:rPr lang="en-US" dirty="0"/>
-              <a:t>required: </a:t>
+              <a:rPr lang="en-US" dirty="0"/>
+              <a:t>Time required: </a:t>
             </a:r>
             <a:r>
               <a:rPr lang="en-US" b="1" u="sng" dirty="0"/>
@@ -5608,10 +5397,9 @@
           <a:lstStyle/>
           <a:p>
             <a:r>
-              <a:rPr lang="en-US" dirty="0" smtClean="0"/>
+              <a:rPr lang="en-US" dirty="0"/>
               <a:t>STORY 4:Add Player</a:t>
             </a:r>
-            <a:endParaRPr lang="en-US" dirty="0"/>
           </a:p>
         </p:txBody>
       </p:sp>
@@ -5637,12 +5425,8 @@
               <a:buAutoNum type="alphaUcPeriod"/>
             </a:pPr>
             <a:r>
-              <a:rPr lang="en-US" dirty="0" smtClean="0"/>
-              <a:t>Description </a:t>
-            </a:r>
-            <a:r>
-              <a:rPr lang="en-US" dirty="0"/>
-              <a:t>Form for developer to add a player’s information</a:t>
+              <a:rPr lang="en-US" dirty="0"/>
+              <a:t>Description Form for developer to add a player’s information</a:t>
             </a:r>
           </a:p>
           <a:p>
@@ -5701,14 +5485,13 @@
               <a:buAutoNum type="alphaUcPeriod"/>
             </a:pPr>
             <a:r>
-              <a:rPr lang="en-US" dirty="0" smtClean="0"/>
+              <a:rPr lang="en-US" dirty="0"/>
               <a:t>Importance : </a:t>
             </a:r>
             <a:r>
-              <a:rPr lang="en-US" b="1" u="sng" dirty="0" smtClean="0"/>
+              <a:rPr lang="en-US" b="1" u="sng" dirty="0"/>
               <a:t>10</a:t>
             </a:r>
-            <a:endParaRPr lang="en-US" b="1" u="sng" dirty="0"/>
           </a:p>
           <a:p>
             <a:pPr marL="514350" indent="-514350">
@@ -5716,12 +5499,8 @@
               <a:buAutoNum type="alphaUcPeriod"/>
             </a:pPr>
             <a:r>
-              <a:rPr lang="en-US" dirty="0" smtClean="0"/>
-              <a:t>Time </a:t>
-            </a:r>
-            <a:r>
-              <a:rPr lang="en-US" dirty="0"/>
-              <a:t>required: </a:t>
+              <a:rPr lang="en-US" dirty="0"/>
+              <a:t>Time required: </a:t>
             </a:r>
             <a:r>
               <a:rPr lang="en-US" b="1" u="sng" dirty="0"/>
@@ -5779,10 +5558,9 @@
           <a:lstStyle/>
           <a:p>
             <a:r>
-              <a:rPr lang="en-US" dirty="0" smtClean="0"/>
+              <a:rPr lang="en-US" dirty="0"/>
               <a:t>STORY 5:Add Game</a:t>
             </a:r>
-            <a:endParaRPr lang="en-US" dirty="0"/>
           </a:p>
         </p:txBody>
       </p:sp>
@@ -5816,7 +5594,7 @@
               <a:buAutoNum type="romanUcPeriod"/>
             </a:pPr>
             <a:r>
-              <a:rPr lang="en-US" dirty="0" smtClean="0"/>
+              <a:rPr lang="en-US" dirty="0"/>
               <a:t>Game Name</a:t>
             </a:r>
           </a:p>
@@ -5826,12 +5604,8 @@
               <a:buAutoNum type="romanUcPeriod"/>
             </a:pPr>
             <a:r>
-              <a:rPr lang="en-US" dirty="0" smtClean="0"/>
-              <a:t>In-Game </a:t>
-            </a:r>
-            <a:r>
-              <a:rPr lang="en-US" dirty="0"/>
-              <a:t>Items</a:t>
+              <a:rPr lang="en-US" dirty="0"/>
+              <a:t>In-Game Items</a:t>
             </a:r>
           </a:p>
           <a:p>
@@ -5840,12 +5614,8 @@
               <a:buAutoNum type="romanUcPeriod"/>
             </a:pPr>
             <a:r>
-              <a:rPr lang="en-US" dirty="0" smtClean="0"/>
-              <a:t>In-Game </a:t>
-            </a:r>
-            <a:r>
-              <a:rPr lang="en-US" dirty="0"/>
-              <a:t>Rewards</a:t>
+              <a:rPr lang="en-US" dirty="0"/>
+              <a:t>In-Game Rewards</a:t>
             </a:r>
           </a:p>
           <a:p>
@@ -5854,12 +5624,8 @@
               <a:buAutoNum type="romanUcPeriod"/>
             </a:pPr>
             <a:r>
-              <a:rPr lang="en-US" dirty="0" smtClean="0"/>
-              <a:t>In-Game </a:t>
-            </a:r>
-            <a:r>
-              <a:rPr lang="en-US" dirty="0"/>
-              <a:t>Currency</a:t>
+              <a:rPr lang="en-US" dirty="0"/>
+              <a:t>In-Game Currency</a:t>
             </a:r>
           </a:p>
           <a:p>
@@ -5868,12 +5634,8 @@
               <a:buAutoNum type="romanUcPeriod"/>
             </a:pPr>
             <a:r>
-              <a:rPr lang="en-US" dirty="0" smtClean="0"/>
-              <a:t>Additional </a:t>
-            </a:r>
-            <a:r>
-              <a:rPr lang="en-US" dirty="0"/>
-              <a:t>fields</a:t>
+              <a:rPr lang="en-US" dirty="0"/>
+              <a:t>Additional fields</a:t>
             </a:r>
           </a:p>
           <a:p>
@@ -5882,7 +5644,7 @@
               <a:buAutoNum type="alphaUcPeriod"/>
             </a:pPr>
             <a:r>
-              <a:rPr lang="en-US" dirty="0" smtClean="0"/>
+              <a:rPr lang="en-US" dirty="0"/>
               <a:t>Importance: </a:t>
             </a:r>
             <a:r>
@@ -5896,12 +5658,8 @@
               <a:buAutoNum type="alphaUcPeriod"/>
             </a:pPr>
             <a:r>
-              <a:rPr lang="en-US" dirty="0" smtClean="0"/>
-              <a:t>Time </a:t>
-            </a:r>
-            <a:r>
-              <a:rPr lang="en-US" dirty="0"/>
-              <a:t>required: </a:t>
+              <a:rPr lang="en-US" dirty="0"/>
+              <a:t>Time required: </a:t>
             </a:r>
             <a:r>
               <a:rPr lang="en-US" b="1" u="sng" dirty="0"/>
@@ -5960,19 +5718,15 @@
           </a:bodyPr>
           <a:lstStyle/>
           <a:p>
-            <a:r>
-              <a:rPr lang="en-US" dirty="0" smtClean="0"/>
-              <a:t/>
-            </a:r>
             <a:br>
-              <a:rPr lang="en-US" dirty="0" smtClean="0"/>
+              <a:rPr lang="en-US" dirty="0"/>
             </a:br>
             <a:r>
-              <a:rPr lang="en-US" dirty="0" smtClean="0"/>
+              <a:rPr lang="en-US" dirty="0"/>
               <a:t>Story 5:Add Character</a:t>
             </a:r>
             <a:br>
-              <a:rPr lang="en-US" dirty="0" smtClean="0"/>
+              <a:rPr lang="en-US" dirty="0"/>
             </a:br>
             <a:endParaRPr lang="en-US" dirty="0"/>
           </a:p>
@@ -5998,12 +5752,8 @@
               <a:buAutoNum type="alphaUcPeriod"/>
             </a:pPr>
             <a:r>
-              <a:rPr lang="en-US" dirty="0" smtClean="0"/>
-              <a:t> </a:t>
-            </a:r>
-            <a:r>
-              <a:rPr lang="en-US" dirty="0"/>
-              <a:t>Description: Form to add characters to a player</a:t>
+              <a:rPr lang="en-US" dirty="0"/>
+              <a:t> Description: Form to add characters to a player</a:t>
             </a:r>
           </a:p>
           <a:p>
@@ -6012,7 +5762,7 @@
               <a:buAutoNum type="alphaUcPeriod"/>
             </a:pPr>
             <a:r>
-              <a:rPr lang="en-US" dirty="0" smtClean="0"/>
+              <a:rPr lang="en-US" dirty="0"/>
               <a:t>Importance :</a:t>
             </a:r>
             <a:r>
@@ -6026,12 +5776,8 @@
               <a:buAutoNum type="alphaUcPeriod"/>
             </a:pPr>
             <a:r>
-              <a:rPr lang="en-US" dirty="0" smtClean="0"/>
-              <a:t>Time </a:t>
-            </a:r>
-            <a:r>
-              <a:rPr lang="en-US" dirty="0"/>
-              <a:t>required: </a:t>
+              <a:rPr lang="en-US" dirty="0"/>
+              <a:t>Time required: </a:t>
             </a:r>
             <a:r>
               <a:rPr lang="en-US" b="1" u="sng" dirty="0"/>
@@ -6092,10 +5838,9 @@
           <a:lstStyle/>
           <a:p>
             <a:r>
-              <a:rPr lang="en-US" dirty="0" smtClean="0"/>
+              <a:rPr lang="en-US" dirty="0"/>
               <a:t>Story 7:Modify Player</a:t>
             </a:r>
-            <a:endParaRPr lang="en-US" dirty="0"/>
           </a:p>
         </p:txBody>
       </p:sp>
@@ -6121,12 +5866,8 @@
               <a:buAutoNum type="alphaUcPeriod"/>
             </a:pPr>
             <a:r>
-              <a:rPr lang="en-US" dirty="0" smtClean="0"/>
-              <a:t>Description</a:t>
-            </a:r>
-            <a:r>
-              <a:rPr lang="en-US" dirty="0"/>
-              <a:t>: Form for developer to modify a player’s information</a:t>
+              <a:rPr lang="en-US" dirty="0"/>
+              <a:t>Description: Form for developer to modify a player’s information</a:t>
             </a:r>
           </a:p>
           <a:p>
@@ -6185,14 +5926,13 @@
               <a:buAutoNum type="alphaUcPeriod"/>
             </a:pPr>
             <a:r>
-              <a:rPr lang="en-US" dirty="0" smtClean="0"/>
+              <a:rPr lang="en-US" dirty="0"/>
               <a:t>Importance :</a:t>
             </a:r>
             <a:r>
-              <a:rPr lang="en-US" b="1" u="sng" dirty="0" smtClean="0"/>
+              <a:rPr lang="en-US" b="1" u="sng" dirty="0"/>
               <a:t>10</a:t>
             </a:r>
-            <a:endParaRPr lang="en-US" b="1" u="sng" dirty="0"/>
           </a:p>
           <a:p>
             <a:pPr marL="514350" indent="-514350">
@@ -6200,12 +5940,8 @@
               <a:buAutoNum type="alphaUcPeriod"/>
             </a:pPr>
             <a:r>
-              <a:rPr lang="en-US" dirty="0" smtClean="0"/>
-              <a:t>Time </a:t>
-            </a:r>
-            <a:r>
-              <a:rPr lang="en-US" dirty="0"/>
-              <a:t>required: </a:t>
+              <a:rPr lang="en-US" dirty="0"/>
+              <a:t>Time required: </a:t>
             </a:r>
             <a:r>
               <a:rPr lang="en-US" b="1" u="sng" dirty="0"/>

</xml_diff>